<commit_message>
fix minor mistake and update ppt with code smell in quiz
</commit_message>
<xml_diff>
--- a/Code Smell.pptx
+++ b/Code Smell.pptx
@@ -5,7 +5,7 @@
     <p:sldMasterId id="2147483648" r:id="rId1"/>
   </p:sldMasterIdLst>
   <p:notesMasterIdLst>
-    <p:notesMasterId r:id="rId20"/>
+    <p:notesMasterId r:id="rId22"/>
   </p:notesMasterIdLst>
   <p:sldIdLst>
     <p:sldId id="271" r:id="rId2"/>
@@ -26,6 +26,8 @@
     <p:sldId id="263" r:id="rId17"/>
     <p:sldId id="265" r:id="rId18"/>
     <p:sldId id="267" r:id="rId19"/>
+    <p:sldId id="275" r:id="rId20"/>
+    <p:sldId id="276" r:id="rId21"/>
   </p:sldIdLst>
   <p:sldSz cx="12192000" cy="6858000"/>
   <p:notesSz cx="6858000" cy="9144000"/>
@@ -6065,6 +6067,205 @@
 </p:sld>
 </file>
 
+<file path=ppt/slides/slide19.xml><?xml version="1.0" encoding="utf-8"?>
+<p:sld xmlns:a="http://schemas.openxmlformats.org/drawingml/2006/main" xmlns:r="http://schemas.openxmlformats.org/officeDocument/2006/relationships" xmlns:p="http://schemas.openxmlformats.org/presentationml/2006/main" show="0">
+  <p:cSld>
+    <p:spTree>
+      <p:nvGrpSpPr>
+        <p:cNvPr id="1" name=""/>
+        <p:cNvGrpSpPr/>
+        <p:nvPr/>
+      </p:nvGrpSpPr>
+      <p:grpSpPr>
+        <a:xfrm>
+          <a:off x="0" y="0"/>
+          <a:ext cx="0" cy="0"/>
+          <a:chOff x="0" y="0"/>
+          <a:chExt cx="0" cy="0"/>
+        </a:xfrm>
+      </p:grpSpPr>
+      <p:sp>
+        <p:nvSpPr>
+          <p:cNvPr id="2" name="標題 1"/>
+          <p:cNvSpPr>
+            <a:spLocks noGrp="1"/>
+          </p:cNvSpPr>
+          <p:nvPr>
+            <p:ph type="title"/>
+          </p:nvPr>
+        </p:nvSpPr>
+        <p:spPr/>
+        <p:txBody>
+          <a:bodyPr/>
+          <a:lstStyle/>
+          <a:p>
+            <a:r>
+              <a:rPr lang="en-US" altLang="zh-TW" dirty="0" err="1"/>
+              <a:t>q</a:t>
+            </a:r>
+            <a:r>
+              <a:rPr lang="en-US" altLang="zh-TW" dirty="0" err="1" smtClean="0"/>
+              <a:t>uiz.h</a:t>
+            </a:r>
+            <a:endParaRPr lang="zh-TW" altLang="en-US" dirty="0"/>
+          </a:p>
+        </p:txBody>
+      </p:sp>
+      <p:sp>
+        <p:nvSpPr>
+          <p:cNvPr id="3" name="內容版面配置區 2"/>
+          <p:cNvSpPr>
+            <a:spLocks noGrp="1"/>
+          </p:cNvSpPr>
+          <p:nvPr>
+            <p:ph idx="1"/>
+          </p:nvPr>
+        </p:nvSpPr>
+        <p:spPr/>
+        <p:txBody>
+          <a:bodyPr/>
+          <a:lstStyle/>
+          <a:p>
+            <a:r>
+              <a:rPr lang="en-US" altLang="zh-TW" dirty="0" err="1" smtClean="0"/>
+              <a:t>questionVector</a:t>
+            </a:r>
+            <a:r>
+              <a:rPr lang="en-US" altLang="zh-TW" dirty="0" smtClean="0"/>
+              <a:t> </a:t>
+            </a:r>
+            <a:r>
+              <a:rPr lang="zh-TW" altLang="en-US" dirty="0" smtClean="0"/>
+              <a:t>應該為 </a:t>
+            </a:r>
+            <a:r>
+              <a:rPr lang="en-US" altLang="zh-TW" dirty="0" smtClean="0"/>
+              <a:t>questions</a:t>
+            </a:r>
+            <a:r>
+              <a:rPr lang="zh-TW" altLang="en-US" dirty="0" smtClean="0"/>
+              <a:t>，不應該出現型態</a:t>
+            </a:r>
+            <a:r>
+              <a:rPr lang="en-US" altLang="zh-TW" dirty="0" smtClean="0"/>
+              <a:t>.</a:t>
+            </a:r>
+          </a:p>
+          <a:p>
+            <a:r>
+              <a:rPr lang="en-US" altLang="zh-TW" dirty="0" err="1" smtClean="0"/>
+              <a:t>scoreCal</a:t>
+            </a:r>
+            <a:r>
+              <a:rPr lang="en-US" altLang="zh-TW" dirty="0" smtClean="0"/>
+              <a:t> </a:t>
+            </a:r>
+          </a:p>
+          <a:p>
+            <a:pPr lvl="1"/>
+            <a:r>
+              <a:rPr lang="en-US" altLang="zh-TW" dirty="0"/>
+              <a:t>t</a:t>
+            </a:r>
+            <a:r>
+              <a:rPr lang="en-US" altLang="zh-TW" dirty="0" smtClean="0"/>
+              <a:t>emp </a:t>
+            </a:r>
+            <a:r>
+              <a:rPr lang="zh-TW" altLang="en-US" dirty="0" smtClean="0"/>
+              <a:t>重複使用，應直接使用</a:t>
+            </a:r>
+            <a:r>
+              <a:rPr lang="en-US" altLang="zh-TW" dirty="0" err="1" smtClean="0"/>
+              <a:t>totalScore</a:t>
+            </a:r>
+            <a:r>
+              <a:rPr lang="zh-TW" altLang="en-US" dirty="0" smtClean="0"/>
+              <a:t>加總</a:t>
+            </a:r>
+            <a:endParaRPr lang="en-US" altLang="zh-TW" dirty="0" smtClean="0"/>
+          </a:p>
+          <a:p>
+            <a:pPr lvl="1"/>
+            <a:r>
+              <a:rPr lang="en-US" altLang="zh-TW" dirty="0" smtClean="0"/>
+              <a:t>19</a:t>
+            </a:r>
+            <a:r>
+              <a:rPr lang="zh-TW" altLang="en-US" dirty="0" smtClean="0"/>
+              <a:t>行，</a:t>
+            </a:r>
+            <a:r>
+              <a:rPr lang="en-US" altLang="zh-TW" dirty="0" smtClean="0"/>
+              <a:t>2.5</a:t>
+            </a:r>
+            <a:r>
+              <a:rPr lang="zh-TW" altLang="en-US" dirty="0" smtClean="0"/>
+              <a:t>為常數，應宣告為常數。</a:t>
+            </a:r>
+            <a:endParaRPr lang="en-US" altLang="zh-TW" dirty="0" smtClean="0"/>
+          </a:p>
+          <a:p>
+            <a:r>
+              <a:rPr lang="en-US" altLang="zh-TW" dirty="0" err="1" smtClean="0"/>
+              <a:t>changeQuestionScore</a:t>
+            </a:r>
+            <a:endParaRPr lang="en-US" altLang="zh-TW" dirty="0" smtClean="0"/>
+          </a:p>
+          <a:p>
+            <a:pPr lvl="1"/>
+            <a:r>
+              <a:rPr lang="zh-TW" altLang="en-US" dirty="0" smtClean="0"/>
+              <a:t>參數</a:t>
+            </a:r>
+            <a:r>
+              <a:rPr lang="en-US" altLang="zh-TW" dirty="0" smtClean="0"/>
+              <a:t>q</a:t>
+            </a:r>
+            <a:r>
+              <a:rPr lang="zh-TW" altLang="en-US" dirty="0" smtClean="0"/>
+              <a:t>，應為</a:t>
+            </a:r>
+            <a:r>
+              <a:rPr lang="en-US" altLang="zh-TW" dirty="0" smtClean="0"/>
+              <a:t>question</a:t>
+            </a:r>
+          </a:p>
+          <a:p>
+            <a:pPr lvl="1"/>
+            <a:r>
+              <a:rPr lang="zh-TW" altLang="en-US" dirty="0" smtClean="0"/>
+              <a:t>這個函式應移到</a:t>
+            </a:r>
+            <a:r>
+              <a:rPr lang="en-US" altLang="zh-TW" dirty="0" err="1" smtClean="0"/>
+              <a:t>question.h</a:t>
+            </a:r>
+            <a:endParaRPr lang="en-US" altLang="zh-TW" dirty="0"/>
+          </a:p>
+        </p:txBody>
+      </p:sp>
+    </p:spTree>
+    <p:extLst>
+      <p:ext uri="{BB962C8B-B14F-4D97-AF65-F5344CB8AC3E}">
+        <p14:creationId xmlns:p14="http://schemas.microsoft.com/office/powerpoint/2010/main" val="966248900"/>
+      </p:ext>
+    </p:extLst>
+  </p:cSld>
+  <p:clrMapOvr>
+    <a:masterClrMapping/>
+  </p:clrMapOvr>
+  <mc:AlternateContent xmlns:mc="http://schemas.openxmlformats.org/markup-compatibility/2006">
+    <mc:Choice xmlns:p14="http://schemas.microsoft.com/office/powerpoint/2010/main" Requires="p14">
+      <p:transition spd="slow" p14:dur="2000"/>
+    </mc:Choice>
+    <mc:Fallback>
+      <p:transition spd="slow"/>
+    </mc:Fallback>
+  </mc:AlternateContent>
+</p:sld>
+</file>
+
 <file path=ppt/slides/slide2.xml><?xml version="1.0" encoding="utf-8"?>
 <p:sld xmlns:a="http://schemas.openxmlformats.org/drawingml/2006/main" xmlns:r="http://schemas.openxmlformats.org/officeDocument/2006/relationships" xmlns:p="http://schemas.openxmlformats.org/presentationml/2006/main">
   <p:cSld>
@@ -6310,6 +6511,138 @@
       </p:par>
     </p:tnLst>
   </p:timing>
+</p:sld>
+</file>
+
+<file path=ppt/slides/slide20.xml><?xml version="1.0" encoding="utf-8"?>
+<p:sld xmlns:a="http://schemas.openxmlformats.org/drawingml/2006/main" xmlns:r="http://schemas.openxmlformats.org/officeDocument/2006/relationships" xmlns:p="http://schemas.openxmlformats.org/presentationml/2006/main" show="0">
+  <p:cSld>
+    <p:spTree>
+      <p:nvGrpSpPr>
+        <p:cNvPr id="1" name=""/>
+        <p:cNvGrpSpPr/>
+        <p:nvPr/>
+      </p:nvGrpSpPr>
+      <p:grpSpPr>
+        <a:xfrm>
+          <a:off x="0" y="0"/>
+          <a:ext cx="0" cy="0"/>
+          <a:chOff x="0" y="0"/>
+          <a:chExt cx="0" cy="0"/>
+        </a:xfrm>
+      </p:grpSpPr>
+      <p:sp>
+        <p:nvSpPr>
+          <p:cNvPr id="2" name="標題 1"/>
+          <p:cNvSpPr>
+            <a:spLocks noGrp="1"/>
+          </p:cNvSpPr>
+          <p:nvPr>
+            <p:ph type="title"/>
+          </p:nvPr>
+        </p:nvSpPr>
+        <p:spPr/>
+        <p:txBody>
+          <a:bodyPr/>
+          <a:lstStyle/>
+          <a:p>
+            <a:r>
+              <a:rPr lang="en-US" altLang="zh-TW" dirty="0" err="1" smtClean="0"/>
+              <a:t>questions.h</a:t>
+            </a:r>
+            <a:endParaRPr lang="zh-TW" altLang="en-US" dirty="0"/>
+          </a:p>
+        </p:txBody>
+      </p:sp>
+      <p:sp>
+        <p:nvSpPr>
+          <p:cNvPr id="3" name="內容版面配置區 2"/>
+          <p:cNvSpPr>
+            <a:spLocks noGrp="1"/>
+          </p:cNvSpPr>
+          <p:nvPr>
+            <p:ph idx="1"/>
+          </p:nvPr>
+        </p:nvSpPr>
+        <p:spPr/>
+        <p:txBody>
+          <a:bodyPr/>
+          <a:lstStyle/>
+          <a:p>
+            <a:r>
+              <a:rPr lang="en-US" altLang="zh-TW" dirty="0" smtClean="0"/>
+              <a:t>Constructor</a:t>
+            </a:r>
+            <a:r>
+              <a:rPr lang="zh-TW" altLang="en-US" dirty="0" smtClean="0"/>
+              <a:t>為</a:t>
+            </a:r>
+            <a:r>
+              <a:rPr lang="en-US" altLang="zh-TW" dirty="0" smtClean="0"/>
+              <a:t>long parameter</a:t>
+            </a:r>
+          </a:p>
+          <a:p>
+            <a:r>
+              <a:rPr lang="en-US" altLang="zh-TW" dirty="0" smtClean="0"/>
+              <a:t>Private</a:t>
+            </a:r>
+            <a:r>
+              <a:rPr lang="zh-TW" altLang="en-US" dirty="0" smtClean="0"/>
+              <a:t> 的變數命名應為 </a:t>
+            </a:r>
+            <a:r>
+              <a:rPr lang="en-US" altLang="zh-TW" dirty="0" smtClean="0"/>
+              <a:t>question, answer</a:t>
+            </a:r>
+          </a:p>
+          <a:p>
+            <a:r>
+              <a:rPr lang="en-US" altLang="zh-TW" dirty="0" smtClean="0"/>
+              <a:t>Index</a:t>
+            </a:r>
+            <a:r>
+              <a:rPr lang="zh-TW" altLang="en-US" dirty="0" smtClean="0"/>
+              <a:t>應為</a:t>
+            </a:r>
+            <a:r>
+              <a:rPr lang="en-US" altLang="zh-TW" dirty="0" smtClean="0"/>
+              <a:t>private</a:t>
+            </a:r>
+            <a:r>
+              <a:rPr lang="zh-TW" altLang="en-US" dirty="0" smtClean="0"/>
+              <a:t>，不可被</a:t>
+            </a:r>
+            <a:r>
+              <a:rPr lang="en-US" altLang="zh-TW" dirty="0" err="1" smtClean="0"/>
+              <a:t>quiz.h</a:t>
+            </a:r>
+            <a:r>
+              <a:rPr lang="zh-TW" altLang="en-US" dirty="0" smtClean="0"/>
+              <a:t>直接使用</a:t>
+            </a:r>
+            <a:endParaRPr lang="zh-TW" altLang="en-US" dirty="0"/>
+          </a:p>
+        </p:txBody>
+      </p:sp>
+    </p:spTree>
+    <p:extLst>
+      <p:ext uri="{BB962C8B-B14F-4D97-AF65-F5344CB8AC3E}">
+        <p14:creationId xmlns:p14="http://schemas.microsoft.com/office/powerpoint/2010/main" val="1668470761"/>
+      </p:ext>
+    </p:extLst>
+  </p:cSld>
+  <p:clrMapOvr>
+    <a:masterClrMapping/>
+  </p:clrMapOvr>
+  <mc:AlternateContent xmlns:mc="http://schemas.openxmlformats.org/markup-compatibility/2006">
+    <mc:Choice xmlns:p14="http://schemas.microsoft.com/office/powerpoint/2010/main" Requires="p14">
+      <p:transition spd="slow" p14:dur="2000"/>
+    </mc:Choice>
+    <mc:Fallback>
+      <p:transition spd="slow"/>
+    </mc:Fallback>
+  </mc:AlternateContent>
 </p:sld>
 </file>
 

</xml_diff>